<commit_message>
[UI] Update image picture to support DCD, NFCB, DBBT
Signed-off-by: Jay Heng <jie.heng@nxp.com>
</commit_message>
<xml_diff>
--- a/img/i.MX RT image layout.pptx
+++ b/img/i.MX RT image layout.pptx
@@ -3,16 +3,16 @@
 <p:presentation xmlns:a="http://schemas.openxmlformats.org/drawingml/2006/main" xmlns:r="http://schemas.openxmlformats.org/officeDocument/2006/relationships" xmlns:p="http://schemas.openxmlformats.org/presentationml/2006/main" firstSlideNum="0">
   <p:sldMasterIdLst>
     <p:sldMasterId id="2147483648" r:id="rId1"/>
-    <p:sldMasterId id="2147483666" r:id="rId3"/>
+    <p:sldMasterId id="2147483666" r:id="rId2"/>
   </p:sldMasterIdLst>
   <p:notesMasterIdLst>
-    <p:notesMasterId r:id="rId5"/>
+    <p:notesMasterId r:id="rId4"/>
   </p:notesMasterIdLst>
   <p:handoutMasterIdLst>
-    <p:handoutMasterId r:id="rId6"/>
+    <p:handoutMasterId r:id="rId5"/>
   </p:handoutMasterIdLst>
   <p:sldIdLst>
-    <p:sldId id="637" r:id="rId4"/>
+    <p:sldId id="637" r:id="rId3"/>
   </p:sldIdLst>
   <p:sldSz cx="12192000" cy="6858000"/>
   <p:notesSz cx="7315200" cy="9601200"/>
@@ -141,6 +141,36 @@
       </a:defRPr>
     </a:lvl9pPr>
   </p:defaultTextStyle>
+  <p:extLst>
+    <p:ext uri="{EFAFB233-063F-42B5-8137-9DF3F51BA10A}">
+      <p15:sldGuideLst xmlns:p15="http://schemas.microsoft.com/office/powerpoint/2012/main">
+        <p15:guide id="1" orient="horz" pos="2200">
+          <p15:clr>
+            <a:srgbClr val="A4A3A4"/>
+          </p15:clr>
+        </p15:guide>
+        <p15:guide id="2" pos="3815">
+          <p15:clr>
+            <a:srgbClr val="A4A3A4"/>
+          </p15:clr>
+        </p15:guide>
+      </p15:sldGuideLst>
+    </p:ext>
+    <p:ext uri="{2D200454-40CA-4A62-9FC3-DE9A4176ACB9}">
+      <p15:notesGuideLst xmlns:p15="http://schemas.microsoft.com/office/powerpoint/2012/main">
+        <p15:guide id="1" orient="horz" pos="3081">
+          <p15:clr>
+            <a:srgbClr val="A4A3A4"/>
+          </p15:clr>
+        </p15:guide>
+        <p15:guide id="2" pos="2289">
+          <p15:clr>
+            <a:srgbClr val="A4A3A4"/>
+          </p15:clr>
+        </p15:guide>
+      </p15:notesGuideLst>
+    </p:ext>
+  </p:extLst>
 </p:presentation>
 </file>
 
@@ -218,6 +248,7 @@
                   </a:schemeClr>
                 </a:solidFill>
               </a:rPr>
+              <a:t>12/20/2018 10:37:11 PM</a:t>
             </a:fld>
             <a:endParaRPr lang="en-US" sz="900" dirty="0">
               <a:solidFill>
@@ -274,14 +305,6 @@
               </a:rPr>
               <a:t>Confidential and Proprietary, © NXP</a:t>
             </a:r>
-            <a:endParaRPr lang="en-US" sz="900" dirty="0">
-              <a:solidFill>
-                <a:schemeClr val="tx1">
-                  <a:lumMod val="75000"/>
-                  <a:lumOff val="25000"/>
-                </a:schemeClr>
-              </a:solidFill>
-            </a:endParaRPr>
           </a:p>
         </p:txBody>
       </p:sp>
@@ -327,6 +350,7 @@
                   </a:schemeClr>
                 </a:solidFill>
               </a:rPr>
+              <a:t>‹#›</a:t>
             </a:fld>
             <a:endParaRPr lang="en-US" sz="1000" dirty="0">
               <a:solidFill>
@@ -1340,7 +1364,6 @@
               <a:rPr lang="en-US"/>
               <a:t>Click to edit Master text styles</a:t>
             </a:r>
-            <a:endParaRPr lang="en-US"/>
           </a:p>
           <a:p>
             <a:pPr lvl="1"/>
@@ -1348,7 +1371,6 @@
               <a:rPr lang="en-US"/>
               <a:t>Second level</a:t>
             </a:r>
-            <a:endParaRPr lang="en-US"/>
           </a:p>
           <a:p>
             <a:pPr lvl="2"/>
@@ -1356,7 +1378,6 @@
               <a:rPr lang="en-US"/>
               <a:t>Third level</a:t>
             </a:r>
-            <a:endParaRPr lang="en-US"/>
           </a:p>
           <a:p>
             <a:pPr lvl="3"/>
@@ -1364,7 +1385,6 @@
               <a:rPr lang="en-US"/>
               <a:t>Fourth level</a:t>
             </a:r>
-            <a:endParaRPr lang="en-US"/>
           </a:p>
           <a:p>
             <a:pPr lvl="4"/>
@@ -1372,7 +1392,6 @@
               <a:rPr lang="en-US"/>
               <a:t>Fifth level</a:t>
             </a:r>
-            <a:endParaRPr lang="en-US"/>
           </a:p>
         </p:txBody>
       </p:sp>
@@ -1419,6 +1438,7 @@
                   </a:schemeClr>
                 </a:solidFill>
               </a:rPr>
+              <a:t>12/20/2018 10:37:10 PM</a:t>
             </a:fld>
             <a:endParaRPr lang="en-US" sz="900" dirty="0">
               <a:solidFill>
@@ -1475,14 +1495,6 @@
               </a:rPr>
               <a:t>Confidential and Proprietary, © NXP</a:t>
             </a:r>
-            <a:endParaRPr lang="en-US" sz="900" dirty="0">
-              <a:solidFill>
-                <a:schemeClr val="tx1">
-                  <a:lumMod val="75000"/>
-                  <a:lumOff val="25000"/>
-                </a:schemeClr>
-              </a:solidFill>
-            </a:endParaRPr>
           </a:p>
         </p:txBody>
       </p:sp>
@@ -1528,6 +1540,7 @@
                   </a:schemeClr>
                 </a:solidFill>
               </a:rPr>
+              <a:t>‹#›</a:t>
             </a:fld>
             <a:endParaRPr lang="en-US" sz="1000" dirty="0">
               <a:solidFill>
@@ -2577,7 +2590,7 @@
 </file>
 
 <file path=ppt/slideLayouts/slideLayout1.xml><?xml version="1.0" encoding="utf-8"?>
-<p:sldLayout xmlns:a="http://schemas.openxmlformats.org/drawingml/2006/main" xmlns:r="http://schemas.openxmlformats.org/officeDocument/2006/relationships" xmlns:p="http://schemas.openxmlformats.org/presentationml/2006/main" preserve="1" showMasterSp="0" userDrawn="1">
+<p:sldLayout xmlns:a="http://schemas.openxmlformats.org/drawingml/2006/main" xmlns:r="http://schemas.openxmlformats.org/officeDocument/2006/relationships" xmlns:p="http://schemas.openxmlformats.org/presentationml/2006/main" showMasterSp="0" preserve="1" userDrawn="1">
   <p:cSld name="02_Master Title Slide">
     <p:spTree>
       <p:nvGrpSpPr>
@@ -2656,7 +2669,6 @@
               <a:rPr lang="en-US" dirty="0"/>
               <a:t>Click to edit Master text styles</a:t>
             </a:r>
-            <a:endParaRPr lang="en-US" dirty="0"/>
           </a:p>
         </p:txBody>
       </p:sp>
@@ -2718,7 +2730,6 @@
               <a:rPr lang="en-US" dirty="0"/>
               <a:t>Click to edit Master text styles</a:t>
             </a:r>
-            <a:endParaRPr lang="en-US" dirty="0"/>
           </a:p>
         </p:txBody>
       </p:sp>
@@ -2775,7 +2786,6 @@
               <a:rPr lang="en-US" dirty="0"/>
               <a:t>Second Line Optional</a:t>
             </a:r>
-            <a:endParaRPr lang="en-US" dirty="0"/>
           </a:p>
         </p:txBody>
       </p:sp>
@@ -2843,14 +2853,6 @@
               </a:rPr>
               <a:t>CONFIDENTIAL AND PROPRIETARY</a:t>
             </a:r>
-            <a:endParaRPr lang="en-US" sz="1300" b="0" i="0" cap="all" baseline="0" dirty="0">
-              <a:solidFill>
-                <a:schemeClr val="tx1">
-                  <a:lumMod val="50000"/>
-                  <a:lumOff val="50000"/>
-                </a:schemeClr>
-              </a:solidFill>
-            </a:endParaRPr>
           </a:p>
         </p:txBody>
       </p:sp>
@@ -12082,7 +12084,6 @@
               <a:rPr lang="en-US" dirty="0"/>
               <a:t>Click to Add Chart</a:t>
             </a:r>
-            <a:endParaRPr lang="en-US" dirty="0"/>
           </a:p>
         </p:txBody>
       </p:sp>
@@ -12130,7 +12131,6 @@
               <a:rPr lang="en-US" dirty="0"/>
               <a:t>Title Goes Here</a:t>
             </a:r>
-            <a:endParaRPr lang="en-US" dirty="0"/>
           </a:p>
         </p:txBody>
       </p:sp>
@@ -12252,7 +12252,6 @@
               <a:rPr lang="en-US" dirty="0"/>
               <a:t>Click to edit master title style</a:t>
             </a:r>
-            <a:endParaRPr lang="en-US" dirty="0"/>
           </a:p>
         </p:txBody>
       </p:sp>
@@ -13349,7 +13348,6 @@
               <a:rPr lang="en-US" dirty="0"/>
               <a:t>Click to edit master title style</a:t>
             </a:r>
-            <a:endParaRPr lang="en-US" dirty="0"/>
           </a:p>
         </p:txBody>
       </p:sp>
@@ -14446,7 +14444,6 @@
               <a:rPr lang="en-US" dirty="0"/>
               <a:t>Click to edit master title style</a:t>
             </a:r>
-            <a:endParaRPr lang="en-US" dirty="0"/>
           </a:p>
         </p:txBody>
       </p:sp>
@@ -15543,7 +15540,6 @@
               <a:rPr lang="en-US" dirty="0"/>
               <a:t>Click to edit master title style</a:t>
             </a:r>
-            <a:endParaRPr lang="en-US" dirty="0"/>
           </a:p>
         </p:txBody>
       </p:sp>
@@ -16640,7 +16636,6 @@
               <a:rPr lang="en-US" dirty="0"/>
               <a:t>Click to edit master title style</a:t>
             </a:r>
-            <a:endParaRPr lang="en-US" dirty="0"/>
           </a:p>
         </p:txBody>
       </p:sp>
@@ -17737,7 +17732,6 @@
               <a:rPr lang="en-US" dirty="0"/>
               <a:t>Click to edit master title style</a:t>
             </a:r>
-            <a:endParaRPr lang="en-US" dirty="0"/>
           </a:p>
         </p:txBody>
       </p:sp>
@@ -18778,7 +18772,6 @@
               <a:rPr lang="en-US" dirty="0"/>
               <a:t>Title Goes Here</a:t>
             </a:r>
-            <a:endParaRPr lang="en-US" dirty="0"/>
           </a:p>
         </p:txBody>
       </p:sp>
@@ -18807,7 +18800,6 @@
               <a:rPr lang="en-US" dirty="0"/>
               <a:t>Click to edit Master text styles</a:t>
             </a:r>
-            <a:endParaRPr lang="en-US" dirty="0"/>
           </a:p>
           <a:p>
             <a:pPr lvl="1"/>
@@ -18815,7 +18807,6 @@
               <a:rPr lang="en-US" dirty="0"/>
               <a:t>Second level</a:t>
             </a:r>
-            <a:endParaRPr lang="en-US" dirty="0"/>
           </a:p>
           <a:p>
             <a:pPr lvl="2"/>
@@ -18823,7 +18814,6 @@
               <a:rPr lang="en-US" dirty="0"/>
               <a:t>Third level</a:t>
             </a:r>
-            <a:endParaRPr lang="en-US" dirty="0"/>
           </a:p>
           <a:p>
             <a:pPr lvl="3"/>
@@ -18831,7 +18821,6 @@
               <a:rPr lang="en-US" dirty="0"/>
               <a:t>Fourth level</a:t>
             </a:r>
-            <a:endParaRPr lang="en-US" dirty="0"/>
           </a:p>
           <a:p>
             <a:pPr lvl="4"/>
@@ -18839,7 +18828,6 @@
               <a:rPr lang="en-US" dirty="0"/>
               <a:t>Fifth level</a:t>
             </a:r>
-            <a:endParaRPr lang="en-US" dirty="0"/>
           </a:p>
         </p:txBody>
       </p:sp>
@@ -18883,7 +18871,7 @@
 </file>
 
 <file path=ppt/slideLayouts/slideLayout2.xml><?xml version="1.0" encoding="utf-8"?>
-<p:sldLayout xmlns:a="http://schemas.openxmlformats.org/drawingml/2006/main" xmlns:r="http://schemas.openxmlformats.org/officeDocument/2006/relationships" xmlns:p="http://schemas.openxmlformats.org/presentationml/2006/main" preserve="1" showMasterSp="0" userDrawn="1">
+<p:sldLayout xmlns:a="http://schemas.openxmlformats.org/drawingml/2006/main" xmlns:r="http://schemas.openxmlformats.org/officeDocument/2006/relationships" xmlns:p="http://schemas.openxmlformats.org/presentationml/2006/main" showMasterSp="0" preserve="1" userDrawn="1">
   <p:cSld name="3_Master Title Slide">
     <p:spTree>
       <p:nvGrpSpPr>
@@ -18933,7 +18921,6 @@
               <a:rPr lang="en-US" dirty="0"/>
               <a:t>Click to Insert Full Image</a:t>
             </a:r>
-            <a:endParaRPr lang="en-US" dirty="0"/>
           </a:p>
         </p:txBody>
       </p:sp>
@@ -19046,7 +19033,6 @@
               <a:rPr lang="en-US" dirty="0"/>
               <a:t>Click to edit Master text styles</a:t>
             </a:r>
-            <a:endParaRPr lang="en-US" dirty="0"/>
           </a:p>
         </p:txBody>
       </p:sp>
@@ -19101,7 +19087,6 @@
               <a:rPr lang="en-US" dirty="0"/>
               <a:t>Second Line Optional</a:t>
             </a:r>
-            <a:endParaRPr lang="en-US" dirty="0"/>
           </a:p>
         </p:txBody>
       </p:sp>
@@ -19203,11 +19188,6 @@
               </a:rPr>
               <a:t>CONFIDENTIAL AND PROPRIETARY</a:t>
             </a:r>
-            <a:endParaRPr lang="en-US" sz="1300" b="0" i="0" cap="all" baseline="0" dirty="0">
-              <a:solidFill>
-                <a:schemeClr val="bg1"/>
-              </a:solidFill>
-            </a:endParaRPr>
           </a:p>
         </p:txBody>
       </p:sp>
@@ -19361,6 +19341,7 @@
                   <a:schemeClr val="bg1"/>
                 </a:solidFill>
               </a:rPr>
+              <a:t>‹#›</a:t>
             </a:fld>
             <a:endParaRPr lang="en-US" sz="1300" b="0" dirty="0">
               <a:solidFill>
@@ -28612,7 +28593,6 @@
               <a:rPr lang="en-US" dirty="0"/>
               <a:t>Title Goes Here</a:t>
             </a:r>
-            <a:endParaRPr lang="en-US" dirty="0"/>
           </a:p>
         </p:txBody>
       </p:sp>
@@ -28641,7 +28621,6 @@
               <a:rPr lang="en-US" dirty="0"/>
               <a:t>Click to edit Master text styles</a:t>
             </a:r>
-            <a:endParaRPr lang="en-US" dirty="0"/>
           </a:p>
           <a:p>
             <a:pPr lvl="1"/>
@@ -28649,7 +28628,6 @@
               <a:rPr lang="en-US" dirty="0"/>
               <a:t>Second level</a:t>
             </a:r>
-            <a:endParaRPr lang="en-US" dirty="0"/>
           </a:p>
           <a:p>
             <a:pPr lvl="2"/>
@@ -28657,7 +28635,6 @@
               <a:rPr lang="en-US" dirty="0"/>
               <a:t>Third level</a:t>
             </a:r>
-            <a:endParaRPr lang="en-US" dirty="0"/>
           </a:p>
           <a:p>
             <a:pPr lvl="3"/>
@@ -28665,7 +28642,6 @@
               <a:rPr lang="en-US" dirty="0"/>
               <a:t>Fourth level</a:t>
             </a:r>
-            <a:endParaRPr lang="en-US" dirty="0"/>
           </a:p>
           <a:p>
             <a:pPr lvl="4"/>
@@ -28673,7 +28649,6 @@
               <a:rPr lang="en-US" dirty="0"/>
               <a:t>Fifth level</a:t>
             </a:r>
-            <a:endParaRPr lang="en-US" dirty="0"/>
           </a:p>
         </p:txBody>
       </p:sp>
@@ -28749,7 +28724,6 @@
               <a:rPr lang="en-US" dirty="0"/>
               <a:t>Title Goes Here</a:t>
             </a:r>
-            <a:endParaRPr lang="en-US" dirty="0"/>
           </a:p>
         </p:txBody>
       </p:sp>
@@ -28778,7 +28752,6 @@
               <a:rPr lang="en-US" dirty="0"/>
               <a:t>Click to edit Master text styles</a:t>
             </a:r>
-            <a:endParaRPr lang="en-US" dirty="0"/>
           </a:p>
           <a:p>
             <a:pPr lvl="1"/>
@@ -28786,7 +28759,6 @@
               <a:rPr lang="en-US" dirty="0"/>
               <a:t>Second level</a:t>
             </a:r>
-            <a:endParaRPr lang="en-US" dirty="0"/>
           </a:p>
           <a:p>
             <a:pPr lvl="2"/>
@@ -28794,7 +28766,6 @@
               <a:rPr lang="en-US" dirty="0"/>
               <a:t>Third level</a:t>
             </a:r>
-            <a:endParaRPr lang="en-US" dirty="0"/>
           </a:p>
           <a:p>
             <a:pPr lvl="3"/>
@@ -28802,7 +28773,6 @@
               <a:rPr lang="en-US" dirty="0"/>
               <a:t>Fourth level</a:t>
             </a:r>
-            <a:endParaRPr lang="en-US" dirty="0"/>
           </a:p>
           <a:p>
             <a:pPr lvl="4"/>
@@ -28810,7 +28780,6 @@
               <a:rPr lang="en-US" dirty="0"/>
               <a:t>Fifth level</a:t>
             </a:r>
-            <a:endParaRPr lang="en-US" dirty="0"/>
           </a:p>
         </p:txBody>
       </p:sp>
@@ -28839,7 +28808,6 @@
               <a:rPr lang="en-US" dirty="0"/>
               <a:t>Click to edit Master text styles</a:t>
             </a:r>
-            <a:endParaRPr lang="en-US" dirty="0"/>
           </a:p>
           <a:p>
             <a:pPr lvl="1"/>
@@ -28847,7 +28815,6 @@
               <a:rPr lang="en-US" dirty="0"/>
               <a:t>Second level</a:t>
             </a:r>
-            <a:endParaRPr lang="en-US" dirty="0"/>
           </a:p>
           <a:p>
             <a:pPr lvl="2"/>
@@ -28855,7 +28822,6 @@
               <a:rPr lang="en-US" dirty="0"/>
               <a:t>Third level</a:t>
             </a:r>
-            <a:endParaRPr lang="en-US" dirty="0"/>
           </a:p>
           <a:p>
             <a:pPr lvl="3"/>
@@ -28863,7 +28829,6 @@
               <a:rPr lang="en-US" dirty="0"/>
               <a:t>Fourth level</a:t>
             </a:r>
-            <a:endParaRPr lang="en-US" dirty="0"/>
           </a:p>
           <a:p>
             <a:pPr lvl="4"/>
@@ -28871,7 +28836,6 @@
               <a:rPr lang="en-US" dirty="0"/>
               <a:t>Fifth level</a:t>
             </a:r>
-            <a:endParaRPr lang="en-US" dirty="0"/>
           </a:p>
         </p:txBody>
       </p:sp>
@@ -28947,7 +28911,6 @@
               <a:rPr lang="en-US" dirty="0"/>
               <a:t>Title Goes Here</a:t>
             </a:r>
-            <a:endParaRPr lang="en-US" dirty="0"/>
           </a:p>
         </p:txBody>
       </p:sp>
@@ -28976,7 +28939,6 @@
               <a:rPr lang="en-US" dirty="0"/>
               <a:t>Click to edit Master text styles</a:t>
             </a:r>
-            <a:endParaRPr lang="en-US" dirty="0"/>
           </a:p>
           <a:p>
             <a:pPr lvl="1"/>
@@ -28984,7 +28946,6 @@
               <a:rPr lang="en-US" dirty="0"/>
               <a:t>Second level</a:t>
             </a:r>
-            <a:endParaRPr lang="en-US" dirty="0"/>
           </a:p>
           <a:p>
             <a:pPr lvl="2"/>
@@ -28992,7 +28953,6 @@
               <a:rPr lang="en-US" dirty="0"/>
               <a:t>Third level</a:t>
             </a:r>
-            <a:endParaRPr lang="en-US" dirty="0"/>
           </a:p>
           <a:p>
             <a:pPr lvl="3"/>
@@ -29000,7 +28960,6 @@
               <a:rPr lang="en-US" dirty="0"/>
               <a:t>Fourth level</a:t>
             </a:r>
-            <a:endParaRPr lang="en-US" dirty="0"/>
           </a:p>
           <a:p>
             <a:pPr lvl="4"/>
@@ -29008,7 +28967,6 @@
               <a:rPr lang="en-US" dirty="0"/>
               <a:t>Fifth level</a:t>
             </a:r>
-            <a:endParaRPr lang="en-US" dirty="0"/>
           </a:p>
         </p:txBody>
       </p:sp>
@@ -29037,7 +28995,6 @@
               <a:rPr lang="en-US" dirty="0"/>
               <a:t>Click to edit Master text styles</a:t>
             </a:r>
-            <a:endParaRPr lang="en-US" dirty="0"/>
           </a:p>
           <a:p>
             <a:pPr lvl="1"/>
@@ -29045,7 +29002,6 @@
               <a:rPr lang="en-US" dirty="0"/>
               <a:t>Second level</a:t>
             </a:r>
-            <a:endParaRPr lang="en-US" dirty="0"/>
           </a:p>
           <a:p>
             <a:pPr lvl="2"/>
@@ -29053,7 +29009,6 @@
               <a:rPr lang="en-US" dirty="0"/>
               <a:t>Third level</a:t>
             </a:r>
-            <a:endParaRPr lang="en-US" dirty="0"/>
           </a:p>
           <a:p>
             <a:pPr lvl="3"/>
@@ -29061,7 +29016,6 @@
               <a:rPr lang="en-US" dirty="0"/>
               <a:t>Fourth level</a:t>
             </a:r>
-            <a:endParaRPr lang="en-US" dirty="0"/>
           </a:p>
           <a:p>
             <a:pPr lvl="4"/>
@@ -29069,7 +29023,6 @@
               <a:rPr lang="en-US" dirty="0"/>
               <a:t>Fifth level</a:t>
             </a:r>
-            <a:endParaRPr lang="en-US" dirty="0"/>
           </a:p>
         </p:txBody>
       </p:sp>
@@ -29126,7 +29079,6 @@
               <a:rPr lang="en-US" dirty="0"/>
               <a:t>Click to edit Master text styles</a:t>
             </a:r>
-            <a:endParaRPr lang="en-US" dirty="0"/>
           </a:p>
         </p:txBody>
       </p:sp>
@@ -29183,7 +29135,6 @@
               <a:rPr lang="en-US" dirty="0"/>
               <a:t>Click to edit Master text styles</a:t>
             </a:r>
-            <a:endParaRPr lang="en-US" dirty="0"/>
           </a:p>
         </p:txBody>
       </p:sp>
@@ -29259,7 +29210,6 @@
               <a:rPr lang="en-US" dirty="0"/>
               <a:t>Title Goes Here</a:t>
             </a:r>
-            <a:endParaRPr lang="en-US" dirty="0"/>
           </a:p>
         </p:txBody>
       </p:sp>
@@ -29288,7 +29238,6 @@
               <a:rPr lang="en-US" dirty="0"/>
               <a:t>Click to edit Master text styles</a:t>
             </a:r>
-            <a:endParaRPr lang="en-US" dirty="0"/>
           </a:p>
           <a:p>
             <a:pPr lvl="1"/>
@@ -29296,7 +29245,6 @@
               <a:rPr lang="en-US" dirty="0"/>
               <a:t>Second level</a:t>
             </a:r>
-            <a:endParaRPr lang="en-US" dirty="0"/>
           </a:p>
           <a:p>
             <a:pPr lvl="2"/>
@@ -29304,7 +29252,6 @@
               <a:rPr lang="en-US" dirty="0"/>
               <a:t>Third level</a:t>
             </a:r>
-            <a:endParaRPr lang="en-US" dirty="0"/>
           </a:p>
           <a:p>
             <a:pPr lvl="3"/>
@@ -29312,7 +29259,6 @@
               <a:rPr lang="en-US" dirty="0"/>
               <a:t>Fourth level</a:t>
             </a:r>
-            <a:endParaRPr lang="en-US" dirty="0"/>
           </a:p>
           <a:p>
             <a:pPr lvl="4"/>
@@ -29320,7 +29266,6 @@
               <a:rPr lang="en-US" dirty="0"/>
               <a:t>Fifth level</a:t>
             </a:r>
-            <a:endParaRPr lang="en-US" dirty="0"/>
           </a:p>
         </p:txBody>
       </p:sp>
@@ -29365,6 +29310,7 @@
           <a:p>
             <a:fld id="{3BDFDD5F-E85B-4DA3-A4F9-9CF3C7409943}" type="datetime4">
               <a:rPr lang="en-US" smtClean="0"/>
+              <a:t>December 20, 2018</a:t>
             </a:fld>
             <a:endParaRPr lang="en-US" dirty="0"/>
           </a:p>
@@ -29450,7 +29396,6 @@
               <a:rPr lang="en-US" dirty="0"/>
               <a:t>Click to Insert Picture</a:t>
             </a:r>
-            <a:endParaRPr lang="en-US" dirty="0"/>
           </a:p>
         </p:txBody>
       </p:sp>
@@ -29526,7 +29471,6 @@
               <a:rPr lang="en-US" dirty="0"/>
               <a:t>Title Goes Here</a:t>
             </a:r>
-            <a:endParaRPr lang="en-US" dirty="0"/>
           </a:p>
         </p:txBody>
       </p:sp>
@@ -29630,7 +29574,6 @@
               <a:rPr lang="en-US" dirty="0"/>
               <a:t>Title Goes Here</a:t>
             </a:r>
-            <a:endParaRPr lang="en-US" dirty="0"/>
           </a:p>
         </p:txBody>
       </p:sp>
@@ -29664,7 +29607,6 @@
               <a:rPr lang="en-US" dirty="0"/>
               <a:t>Click to Add Table</a:t>
             </a:r>
-            <a:endParaRPr lang="en-US" dirty="0"/>
           </a:p>
         </p:txBody>
       </p:sp>
@@ -29738,7 +29680,6 @@
               <a:rPr lang="en-US" dirty="0"/>
               <a:t>Title Goes Here</a:t>
             </a:r>
-            <a:endParaRPr lang="en-US" dirty="0"/>
           </a:p>
         </p:txBody>
       </p:sp>
@@ -29772,7 +29713,6 @@
               <a:rPr lang="en-US" dirty="0"/>
               <a:t>Click to edit Master text styles</a:t>
             </a:r>
-            <a:endParaRPr lang="en-US" dirty="0"/>
           </a:p>
           <a:p>
             <a:pPr lvl="1"/>
@@ -29780,7 +29720,6 @@
               <a:rPr lang="en-US" dirty="0"/>
               <a:t>Second level</a:t>
             </a:r>
-            <a:endParaRPr lang="en-US" dirty="0"/>
           </a:p>
           <a:p>
             <a:pPr lvl="2"/>
@@ -29788,7 +29727,6 @@
               <a:rPr lang="en-US" dirty="0"/>
               <a:t>Third level</a:t>
             </a:r>
-            <a:endParaRPr lang="en-US" dirty="0"/>
           </a:p>
           <a:p>
             <a:pPr lvl="3"/>
@@ -29796,7 +29734,6 @@
               <a:rPr lang="en-US" dirty="0"/>
               <a:t>Fourth level</a:t>
             </a:r>
-            <a:endParaRPr lang="en-US" dirty="0"/>
           </a:p>
           <a:p>
             <a:pPr lvl="4"/>
@@ -29804,7 +29741,6 @@
               <a:rPr lang="en-US" dirty="0"/>
               <a:t>Fifth level</a:t>
             </a:r>
-            <a:endParaRPr lang="en-US" dirty="0"/>
           </a:p>
         </p:txBody>
       </p:sp>
@@ -29842,14 +29778,6 @@
               </a:rPr>
               <a:t>CONFIDENTIAL AND PROPRIETARY</a:t>
             </a:r>
-            <a:endParaRPr lang="en-US" sz="1300" b="0" i="0" cap="all" baseline="0" dirty="0">
-              <a:solidFill>
-                <a:schemeClr val="tx1">
-                  <a:lumMod val="50000"/>
-                  <a:lumOff val="50000"/>
-                </a:schemeClr>
-              </a:solidFill>
-            </a:endParaRPr>
           </a:p>
         </p:txBody>
       </p:sp>
@@ -30006,6 +29934,7 @@
                   </a:schemeClr>
                 </a:solidFill>
               </a:rPr>
+              <a:t>‹#›</a:t>
             </a:fld>
             <a:endParaRPr lang="en-US" sz="1300" b="0" dirty="0">
               <a:solidFill>
@@ -41028,8 +40957,8 @@
         </p:nvGrpSpPr>
         <p:grpSpPr>
           <a:xfrm>
-            <a:off x="4251793" y="1137070"/>
-            <a:ext cx="2877185" cy="4584065"/>
+            <a:off x="2148673" y="934059"/>
+            <a:ext cx="2877185" cy="4989882"/>
             <a:chOff x="-1039352" y="-84240"/>
             <a:chExt cx="2877185" cy="4584065"/>
           </a:xfrm>
@@ -41113,124 +41042,13 @@
       </p:grpSp>
       <p:sp>
         <p:nvSpPr>
-          <p:cNvPr id="2" name="TextBox 63"/>
-          <p:cNvSpPr txBox="1"/>
-          <p:nvPr/>
-        </p:nvSpPr>
-        <p:spPr>
-          <a:xfrm>
-            <a:off x="4258310" y="1592580"/>
-            <a:ext cx="2870835" cy="245110"/>
-          </a:xfrm>
-          <a:prstGeom prst="rect">
-            <a:avLst/>
-          </a:prstGeom>
-          <a:solidFill>
-            <a:srgbClr val="B000FF"/>
-          </a:solidFill>
-          <a:ln w="19050">
-            <a:solidFill>
-              <a:schemeClr val="tx1"/>
-            </a:solidFill>
-          </a:ln>
-        </p:spPr>
-        <p:txBody>
-          <a:bodyPr wrap="square" rtlCol="0">
-            <a:spAutoFit/>
-          </a:bodyPr>
-          <a:p>
-            <a:pPr algn="ctr"/>
-            <a:r>
-              <a:rPr lang="en-US" sz="1000" dirty="0"/>
-              <a:t>Encrypted Key Info Block</a:t>
-            </a:r>
-            <a:endParaRPr lang="en-US" sz="1000" dirty="0"/>
-          </a:p>
-        </p:txBody>
-      </p:sp>
-      <p:sp>
-        <p:nvSpPr>
-          <p:cNvPr id="57" name="TextBox 63"/>
-          <p:cNvSpPr txBox="1"/>
-          <p:nvPr/>
-        </p:nvSpPr>
-        <p:spPr>
-          <a:xfrm>
-            <a:off x="4262120" y="1137285"/>
-            <a:ext cx="2863215" cy="306705"/>
-          </a:xfrm>
-          <a:prstGeom prst="rect">
-            <a:avLst/>
-          </a:prstGeom>
-          <a:solidFill>
-            <a:srgbClr val="00FFFF"/>
-          </a:solidFill>
-          <a:ln w="19050">
-            <a:solidFill>
-              <a:schemeClr val="tx1"/>
-            </a:solidFill>
-          </a:ln>
-        </p:spPr>
-        <p:txBody>
-          <a:bodyPr wrap="square" rtlCol="0">
-            <a:spAutoFit/>
-          </a:bodyPr>
-          <a:p>
-            <a:pPr algn="ctr"/>
-            <a:r>
-              <a:rPr lang="en-US" sz="1400" dirty="0"/>
-              <a:t>Flash Device Config Block</a:t>
-            </a:r>
-            <a:endParaRPr lang="en-US" sz="1400" dirty="0"/>
-          </a:p>
-        </p:txBody>
-      </p:sp>
-      <p:sp>
-        <p:nvSpPr>
-          <p:cNvPr id="65" name="TextBox 63"/>
-          <p:cNvSpPr txBox="1"/>
-          <p:nvPr/>
-        </p:nvSpPr>
-        <p:spPr>
-          <a:xfrm>
-            <a:off x="4262120" y="1918335"/>
-            <a:ext cx="2870835" cy="245110"/>
-          </a:xfrm>
-          <a:prstGeom prst="rect">
-            <a:avLst/>
-          </a:prstGeom>
-          <a:solidFill>
-            <a:srgbClr val="A52A2A"/>
-          </a:solidFill>
-          <a:ln w="19050">
-            <a:solidFill>
-              <a:schemeClr val="tx1"/>
-            </a:solidFill>
-          </a:ln>
-        </p:spPr>
-        <p:txBody>
-          <a:bodyPr wrap="square" rtlCol="0">
-            <a:spAutoFit/>
-          </a:bodyPr>
-          <a:p>
-            <a:pPr algn="ctr"/>
-            <a:r>
-              <a:rPr lang="en-US" sz="1000" dirty="0"/>
-              <a:t>Encrypted Protection Region Desc Block</a:t>
-            </a:r>
-            <a:endParaRPr lang="en-US" sz="1000" dirty="0"/>
-          </a:p>
-        </p:txBody>
-      </p:sp>
-      <p:sp>
-        <p:nvSpPr>
           <p:cNvPr id="70" name="TextBox 63"/>
           <p:cNvSpPr txBox="1"/>
           <p:nvPr/>
         </p:nvSpPr>
         <p:spPr>
           <a:xfrm>
-            <a:off x="4262120" y="2341880"/>
+            <a:off x="2159000" y="2870200"/>
             <a:ext cx="2870835" cy="306705"/>
           </a:xfrm>
           <a:prstGeom prst="rect">
@@ -41249,6 +41067,7 @@
           <a:bodyPr wrap="square" rtlCol="0">
             <a:spAutoFit/>
           </a:bodyPr>
+          <a:lstStyle/>
           <a:p>
             <a:pPr algn="ctr"/>
             <a:r>
@@ -41269,7 +41088,7 @@
         </p:nvSpPr>
         <p:spPr>
           <a:xfrm>
-            <a:off x="4251960" y="2648585"/>
+            <a:off x="2148840" y="3176905"/>
             <a:ext cx="2870835" cy="306705"/>
           </a:xfrm>
           <a:prstGeom prst="rect">
@@ -41288,6 +41107,7 @@
           <a:bodyPr wrap="square" rtlCol="0">
             <a:spAutoFit/>
           </a:bodyPr>
+          <a:lstStyle/>
           <a:p>
             <a:pPr algn="ctr"/>
             <a:r>
@@ -41308,8 +41128,8 @@
         </p:nvSpPr>
         <p:spPr>
           <a:xfrm>
-            <a:off x="4262120" y="3495675"/>
-            <a:ext cx="2870835" cy="953135"/>
+            <a:off x="2159000" y="4023995"/>
+            <a:ext cx="2870835" cy="738664"/>
           </a:xfrm>
           <a:prstGeom prst="rect">
             <a:avLst/>
@@ -41327,6 +41147,7 @@
           <a:bodyPr wrap="square" rtlCol="0">
             <a:spAutoFit/>
           </a:bodyPr>
+          <a:lstStyle/>
           <a:p>
             <a:pPr algn="ctr"/>
             <a:r>
@@ -41335,9 +41156,6 @@
               </a:rPr>
               <a:t>Application Image</a:t>
             </a:r>
-            <a:endParaRPr lang="en-US" sz="1400" dirty="0">
-              <a:sym typeface="+mn-ea"/>
-            </a:endParaRPr>
           </a:p>
           <a:p>
             <a:pPr algn="ctr"/>
@@ -41351,11 +41169,6 @@
               <a:rPr lang="en-US" sz="1400" dirty="0"/>
               <a:t>Plaintext</a:t>
             </a:r>
-            <a:endParaRPr lang="en-US" sz="1400" dirty="0"/>
-          </a:p>
-          <a:p>
-            <a:pPr algn="ctr"/>
-            <a:endParaRPr lang="en-US" sz="1400" dirty="0"/>
           </a:p>
         </p:txBody>
       </p:sp>
@@ -41367,7 +41180,7 @@
         </p:nvSpPr>
         <p:spPr>
           <a:xfrm>
-            <a:off x="4258310" y="4688205"/>
+            <a:off x="2155190" y="4876316"/>
             <a:ext cx="2870835" cy="521970"/>
           </a:xfrm>
           <a:prstGeom prst="rect">
@@ -41386,6 +41199,7 @@
           <a:bodyPr wrap="square" rtlCol="0">
             <a:spAutoFit/>
           </a:bodyPr>
+          <a:lstStyle/>
           <a:p>
             <a:pPr algn="ctr"/>
             <a:r>
@@ -41416,7 +41230,7 @@
         </p:nvSpPr>
         <p:spPr>
           <a:xfrm>
-            <a:off x="4258310" y="5414645"/>
+            <a:off x="2155190" y="5506505"/>
             <a:ext cx="2870835" cy="306705"/>
           </a:xfrm>
           <a:prstGeom prst="rect">
@@ -41435,6 +41249,7 @@
           <a:bodyPr wrap="square" rtlCol="0">
             <a:spAutoFit/>
           </a:bodyPr>
+          <a:lstStyle/>
           <a:p>
             <a:pPr algn="ctr"/>
             <a:r>
@@ -41444,6 +41259,680 @@
               <a:t>DEK KeyBlob</a:t>
             </a:r>
             <a:endParaRPr lang="en-US" sz="1400" dirty="0"/>
+          </a:p>
+        </p:txBody>
+      </p:sp>
+      <p:sp>
+        <p:nvSpPr>
+          <p:cNvPr id="13" name="TextBox 63">
+            <a:extLst>
+              <a:ext uri="{FF2B5EF4-FFF2-40B4-BE49-F238E27FC236}">
+                <a16:creationId xmlns:a16="http://schemas.microsoft.com/office/drawing/2014/main" id="{5A7B5E0E-50B5-48F4-8729-8EF828C8FF20}"/>
+              </a:ext>
+            </a:extLst>
+          </p:cNvPr>
+          <p:cNvSpPr txBox="1"/>
+          <p:nvPr/>
+        </p:nvSpPr>
+        <p:spPr>
+          <a:xfrm>
+            <a:off x="2155190" y="3534727"/>
+            <a:ext cx="2870835" cy="276999"/>
+          </a:xfrm>
+          <a:prstGeom prst="rect">
+            <a:avLst/>
+          </a:prstGeom>
+          <a:solidFill>
+            <a:schemeClr val="accent3"/>
+          </a:solidFill>
+          <a:ln w="19050">
+            <a:solidFill>
+              <a:schemeClr val="tx1"/>
+            </a:solidFill>
+          </a:ln>
+        </p:spPr>
+        <p:txBody>
+          <a:bodyPr wrap="square" rtlCol="0">
+            <a:spAutoFit/>
+          </a:bodyPr>
+          <a:lstStyle/>
+          <a:p>
+            <a:pPr algn="ctr"/>
+            <a:r>
+              <a:rPr lang="en-US" sz="1200" dirty="0">
+                <a:sym typeface="+mn-ea"/>
+              </a:rPr>
+              <a:t>Device Configuration Data (DCD)</a:t>
+            </a:r>
+            <a:endParaRPr lang="en-US" sz="1200" dirty="0"/>
+          </a:p>
+        </p:txBody>
+      </p:sp>
+      <p:sp>
+        <p:nvSpPr>
+          <p:cNvPr id="14" name="TextBox 63">
+            <a:extLst>
+              <a:ext uri="{FF2B5EF4-FFF2-40B4-BE49-F238E27FC236}">
+                <a16:creationId xmlns:a16="http://schemas.microsoft.com/office/drawing/2014/main" id="{F125CC63-7FD9-4822-A7F1-B97429B09BD6}"/>
+              </a:ext>
+            </a:extLst>
+          </p:cNvPr>
+          <p:cNvSpPr txBox="1"/>
+          <p:nvPr/>
+        </p:nvSpPr>
+        <p:spPr>
+          <a:xfrm>
+            <a:off x="2162810" y="934059"/>
+            <a:ext cx="2863215" cy="276999"/>
+          </a:xfrm>
+          <a:prstGeom prst="rect">
+            <a:avLst/>
+          </a:prstGeom>
+          <a:solidFill>
+            <a:srgbClr val="F9B500"/>
+          </a:solidFill>
+          <a:ln w="19050">
+            <a:solidFill>
+              <a:schemeClr val="tx1"/>
+            </a:solidFill>
+          </a:ln>
+        </p:spPr>
+        <p:txBody>
+          <a:bodyPr wrap="square" rtlCol="0">
+            <a:spAutoFit/>
+          </a:bodyPr>
+          <a:lstStyle/>
+          <a:p>
+            <a:pPr algn="ctr"/>
+            <a:r>
+              <a:rPr lang="en-US" sz="1200" dirty="0"/>
+              <a:t>Nand Flash Config Block (NFCB)</a:t>
+            </a:r>
+          </a:p>
+        </p:txBody>
+      </p:sp>
+      <p:sp>
+        <p:nvSpPr>
+          <p:cNvPr id="15" name="TextBox 63">
+            <a:extLst>
+              <a:ext uri="{FF2B5EF4-FFF2-40B4-BE49-F238E27FC236}">
+                <a16:creationId xmlns:a16="http://schemas.microsoft.com/office/drawing/2014/main" id="{59E20EE5-C49F-44F3-9B74-F04D551C69EF}"/>
+              </a:ext>
+            </a:extLst>
+          </p:cNvPr>
+          <p:cNvSpPr txBox="1"/>
+          <p:nvPr/>
+        </p:nvSpPr>
+        <p:spPr>
+          <a:xfrm>
+            <a:off x="2162810" y="1291881"/>
+            <a:ext cx="2863215" cy="276999"/>
+          </a:xfrm>
+          <a:prstGeom prst="rect">
+            <a:avLst/>
+          </a:prstGeom>
+          <a:solidFill>
+            <a:srgbClr val="CC7F32">
+              <a:alpha val="80000"/>
+            </a:srgbClr>
+          </a:solidFill>
+          <a:ln w="19050">
+            <a:solidFill>
+              <a:schemeClr val="tx1"/>
+            </a:solidFill>
+          </a:ln>
+        </p:spPr>
+        <p:txBody>
+          <a:bodyPr wrap="square" rtlCol="0">
+            <a:spAutoFit/>
+          </a:bodyPr>
+          <a:lstStyle/>
+          <a:p>
+            <a:pPr algn="ctr"/>
+            <a:r>
+              <a:rPr lang="en-US" altLang="zh-CN" sz="1200" dirty="0"/>
+              <a:t>Discovered Bad Blocks Table </a:t>
+            </a:r>
+            <a:r>
+              <a:rPr lang="en-US" sz="1200" dirty="0"/>
+              <a:t>(DBBT)</a:t>
+            </a:r>
+          </a:p>
+        </p:txBody>
+      </p:sp>
+      <p:grpSp>
+        <p:nvGrpSpPr>
+          <p:cNvPr id="17" name="Group 72">
+            <a:extLst>
+              <a:ext uri="{FF2B5EF4-FFF2-40B4-BE49-F238E27FC236}">
+                <a16:creationId xmlns:a16="http://schemas.microsoft.com/office/drawing/2014/main" id="{6929A017-E5BF-4867-B65F-C332D9CA6B40}"/>
+              </a:ext>
+            </a:extLst>
+          </p:cNvPr>
+          <p:cNvGrpSpPr/>
+          <p:nvPr/>
+        </p:nvGrpSpPr>
+        <p:grpSpPr>
+          <a:xfrm>
+            <a:off x="6577211" y="934060"/>
+            <a:ext cx="2877185" cy="4989882"/>
+            <a:chOff x="-1039352" y="-84240"/>
+            <a:chExt cx="2877185" cy="4584065"/>
+          </a:xfrm>
+        </p:grpSpPr>
+        <p:cxnSp>
+          <p:nvCxnSpPr>
+            <p:cNvPr id="18" name="Straight Connector 17">
+              <a:extLst>
+                <a:ext uri="{FF2B5EF4-FFF2-40B4-BE49-F238E27FC236}">
+                  <a16:creationId xmlns:a16="http://schemas.microsoft.com/office/drawing/2014/main" id="{0D6D2D8B-05FF-4C35-989D-28CCC42D0842}"/>
+                </a:ext>
+              </a:extLst>
+            </p:cNvPr>
+            <p:cNvCxnSpPr/>
+            <p:nvPr/>
+          </p:nvCxnSpPr>
+          <p:spPr>
+            <a:xfrm rot="5400000" flipH="1" flipV="1">
+              <a:off x="-1036714" y="2136842"/>
+              <a:ext cx="0" cy="0"/>
+            </a:xfrm>
+            <a:prstGeom prst="line">
+              <a:avLst/>
+            </a:prstGeom>
+          </p:spPr>
+          <p:style>
+            <a:lnRef idx="1">
+              <a:schemeClr val="accent1"/>
+            </a:lnRef>
+            <a:fillRef idx="0">
+              <a:schemeClr val="accent1"/>
+            </a:fillRef>
+            <a:effectRef idx="0">
+              <a:schemeClr val="accent1"/>
+            </a:effectRef>
+            <a:fontRef idx="minor">
+              <a:schemeClr val="tx1"/>
+            </a:fontRef>
+          </p:style>
+        </p:cxnSp>
+        <p:sp>
+          <p:nvSpPr>
+            <p:cNvPr id="19" name="Rectangle 18">
+              <a:extLst>
+                <a:ext uri="{FF2B5EF4-FFF2-40B4-BE49-F238E27FC236}">
+                  <a16:creationId xmlns:a16="http://schemas.microsoft.com/office/drawing/2014/main" id="{1C4610B6-211E-4C6C-BB2B-5D82B71E093A}"/>
+                </a:ext>
+              </a:extLst>
+            </p:cNvPr>
+            <p:cNvSpPr/>
+            <p:nvPr/>
+          </p:nvSpPr>
+          <p:spPr>
+            <a:xfrm>
+              <a:off x="-1039352" y="-84240"/>
+              <a:ext cx="2877185" cy="4584065"/>
+            </a:xfrm>
+            <a:prstGeom prst="rect">
+              <a:avLst/>
+            </a:prstGeom>
+            <a:noFill/>
+            <a:ln>
+              <a:solidFill>
+                <a:schemeClr val="tx1"/>
+              </a:solidFill>
+            </a:ln>
+          </p:spPr>
+          <p:style>
+            <a:lnRef idx="2">
+              <a:schemeClr val="accent1">
+                <a:shade val="50000"/>
+              </a:schemeClr>
+            </a:lnRef>
+            <a:fillRef idx="1">
+              <a:schemeClr val="accent1"/>
+            </a:fillRef>
+            <a:effectRef idx="0">
+              <a:schemeClr val="accent1"/>
+            </a:effectRef>
+            <a:fontRef idx="minor">
+              <a:schemeClr val="lt1"/>
+            </a:fontRef>
+          </p:style>
+          <p:txBody>
+            <a:bodyPr rtlCol="0" anchor="ctr"/>
+            <a:lstStyle/>
+            <a:p>
+              <a:pPr algn="ctr"/>
+              <a:endParaRPr lang="en-US" dirty="0"/>
+            </a:p>
+          </p:txBody>
+        </p:sp>
+      </p:grpSp>
+      <p:sp>
+        <p:nvSpPr>
+          <p:cNvPr id="20" name="TextBox 63">
+            <a:extLst>
+              <a:ext uri="{FF2B5EF4-FFF2-40B4-BE49-F238E27FC236}">
+                <a16:creationId xmlns:a16="http://schemas.microsoft.com/office/drawing/2014/main" id="{00CA6108-9B5C-47AE-8509-C6D55EE10294}"/>
+              </a:ext>
+            </a:extLst>
+          </p:cNvPr>
+          <p:cNvSpPr txBox="1"/>
+          <p:nvPr/>
+        </p:nvSpPr>
+        <p:spPr>
+          <a:xfrm>
+            <a:off x="6589911" y="1352150"/>
+            <a:ext cx="2870835" cy="245110"/>
+          </a:xfrm>
+          <a:prstGeom prst="rect">
+            <a:avLst/>
+          </a:prstGeom>
+          <a:solidFill>
+            <a:srgbClr val="B000FF"/>
+          </a:solidFill>
+          <a:ln w="19050">
+            <a:solidFill>
+              <a:schemeClr val="tx1"/>
+            </a:solidFill>
+          </a:ln>
+        </p:spPr>
+        <p:txBody>
+          <a:bodyPr wrap="square" rtlCol="0">
+            <a:spAutoFit/>
+          </a:bodyPr>
+          <a:lstStyle/>
+          <a:p>
+            <a:pPr algn="ctr"/>
+            <a:r>
+              <a:rPr lang="en-US" sz="1000" dirty="0"/>
+              <a:t>Encrypted Key Info Block (EKIB)</a:t>
+            </a:r>
+          </a:p>
+        </p:txBody>
+      </p:sp>
+      <p:sp>
+        <p:nvSpPr>
+          <p:cNvPr id="21" name="TextBox 63">
+            <a:extLst>
+              <a:ext uri="{FF2B5EF4-FFF2-40B4-BE49-F238E27FC236}">
+                <a16:creationId xmlns:a16="http://schemas.microsoft.com/office/drawing/2014/main" id="{59C64752-7C4F-4656-8192-549779E01E2A}"/>
+              </a:ext>
+            </a:extLst>
+          </p:cNvPr>
+          <p:cNvSpPr txBox="1"/>
+          <p:nvPr/>
+        </p:nvSpPr>
+        <p:spPr>
+          <a:xfrm>
+            <a:off x="6597531" y="934059"/>
+            <a:ext cx="2863215" cy="276999"/>
+          </a:xfrm>
+          <a:prstGeom prst="rect">
+            <a:avLst/>
+          </a:prstGeom>
+          <a:solidFill>
+            <a:srgbClr val="9F9F5F"/>
+          </a:solidFill>
+          <a:ln w="19050">
+            <a:solidFill>
+              <a:schemeClr val="tx1"/>
+            </a:solidFill>
+          </a:ln>
+        </p:spPr>
+        <p:txBody>
+          <a:bodyPr wrap="square" rtlCol="0">
+            <a:spAutoFit/>
+          </a:bodyPr>
+          <a:lstStyle/>
+          <a:p>
+            <a:pPr algn="ctr"/>
+            <a:r>
+              <a:rPr lang="en-US" sz="1200" dirty="0"/>
+              <a:t>Flash Device Config Block (FDCB)</a:t>
+            </a:r>
+          </a:p>
+        </p:txBody>
+      </p:sp>
+      <p:sp>
+        <p:nvSpPr>
+          <p:cNvPr id="22" name="TextBox 63">
+            <a:extLst>
+              <a:ext uri="{FF2B5EF4-FFF2-40B4-BE49-F238E27FC236}">
+                <a16:creationId xmlns:a16="http://schemas.microsoft.com/office/drawing/2014/main" id="{425B4957-B5A6-4512-A48E-6D70102F27BB}"/>
+              </a:ext>
+            </a:extLst>
+          </p:cNvPr>
+          <p:cNvSpPr txBox="1"/>
+          <p:nvPr/>
+        </p:nvSpPr>
+        <p:spPr>
+          <a:xfrm>
+            <a:off x="6593721" y="1677905"/>
+            <a:ext cx="2870835" cy="245110"/>
+          </a:xfrm>
+          <a:prstGeom prst="rect">
+            <a:avLst/>
+          </a:prstGeom>
+          <a:solidFill>
+            <a:srgbClr val="A52A2A"/>
+          </a:solidFill>
+          <a:ln w="19050">
+            <a:solidFill>
+              <a:schemeClr val="tx1"/>
+            </a:solidFill>
+          </a:ln>
+        </p:spPr>
+        <p:txBody>
+          <a:bodyPr wrap="square" rtlCol="0">
+            <a:spAutoFit/>
+          </a:bodyPr>
+          <a:lstStyle/>
+          <a:p>
+            <a:pPr algn="ctr"/>
+            <a:r>
+              <a:rPr lang="en-US" sz="1000" dirty="0"/>
+              <a:t>Encrypted Protection Region Desc Block</a:t>
+            </a:r>
+          </a:p>
+        </p:txBody>
+      </p:sp>
+      <p:sp>
+        <p:nvSpPr>
+          <p:cNvPr id="23" name="TextBox 63">
+            <a:extLst>
+              <a:ext uri="{FF2B5EF4-FFF2-40B4-BE49-F238E27FC236}">
+                <a16:creationId xmlns:a16="http://schemas.microsoft.com/office/drawing/2014/main" id="{A9488513-3B14-48AD-9C05-8385E002B688}"/>
+              </a:ext>
+            </a:extLst>
+          </p:cNvPr>
+          <p:cNvSpPr txBox="1"/>
+          <p:nvPr/>
+        </p:nvSpPr>
+        <p:spPr>
+          <a:xfrm>
+            <a:off x="6593721" y="2101450"/>
+            <a:ext cx="2870835" cy="306705"/>
+          </a:xfrm>
+          <a:prstGeom prst="rect">
+            <a:avLst/>
+          </a:prstGeom>
+          <a:solidFill>
+            <a:srgbClr val="FF0000"/>
+          </a:solidFill>
+          <a:ln w="19050">
+            <a:solidFill>
+              <a:schemeClr val="tx1"/>
+            </a:solidFill>
+          </a:ln>
+        </p:spPr>
+        <p:txBody>
+          <a:bodyPr wrap="square" rtlCol="0">
+            <a:spAutoFit/>
+          </a:bodyPr>
+          <a:lstStyle/>
+          <a:p>
+            <a:pPr algn="ctr"/>
+            <a:r>
+              <a:rPr lang="en-US" sz="1400" dirty="0">
+                <a:sym typeface="+mn-ea"/>
+              </a:rPr>
+              <a:t>Image Vector Table (IVT)</a:t>
+            </a:r>
+            <a:endParaRPr lang="en-US" sz="1400" dirty="0"/>
+          </a:p>
+        </p:txBody>
+      </p:sp>
+      <p:sp>
+        <p:nvSpPr>
+          <p:cNvPr id="24" name="TextBox 63">
+            <a:extLst>
+              <a:ext uri="{FF2B5EF4-FFF2-40B4-BE49-F238E27FC236}">
+                <a16:creationId xmlns:a16="http://schemas.microsoft.com/office/drawing/2014/main" id="{A7719C2B-02A1-43BC-93EC-E5DEFF49C520}"/>
+              </a:ext>
+            </a:extLst>
+          </p:cNvPr>
+          <p:cNvSpPr txBox="1"/>
+          <p:nvPr/>
+        </p:nvSpPr>
+        <p:spPr>
+          <a:xfrm>
+            <a:off x="6583561" y="2408155"/>
+            <a:ext cx="2870835" cy="306705"/>
+          </a:xfrm>
+          <a:prstGeom prst="rect">
+            <a:avLst/>
+          </a:prstGeom>
+          <a:solidFill>
+            <a:srgbClr val="00B050"/>
+          </a:solidFill>
+          <a:ln w="19050">
+            <a:solidFill>
+              <a:schemeClr val="tx1"/>
+            </a:solidFill>
+          </a:ln>
+        </p:spPr>
+        <p:txBody>
+          <a:bodyPr wrap="square" rtlCol="0">
+            <a:spAutoFit/>
+          </a:bodyPr>
+          <a:lstStyle/>
+          <a:p>
+            <a:pPr algn="ctr"/>
+            <a:r>
+              <a:rPr lang="en-US" sz="1400" dirty="0">
+                <a:sym typeface="+mn-ea"/>
+              </a:rPr>
+              <a:t>Boot Data</a:t>
+            </a:r>
+            <a:endParaRPr lang="en-US" sz="1400" dirty="0"/>
+          </a:p>
+        </p:txBody>
+      </p:sp>
+      <p:sp>
+        <p:nvSpPr>
+          <p:cNvPr id="25" name="TextBox 63">
+            <a:extLst>
+              <a:ext uri="{FF2B5EF4-FFF2-40B4-BE49-F238E27FC236}">
+                <a16:creationId xmlns:a16="http://schemas.microsoft.com/office/drawing/2014/main" id="{172641C9-FE19-44EE-86F5-5D50E2F1B7BD}"/>
+              </a:ext>
+            </a:extLst>
+          </p:cNvPr>
+          <p:cNvSpPr txBox="1"/>
+          <p:nvPr/>
+        </p:nvSpPr>
+        <p:spPr>
+          <a:xfrm>
+            <a:off x="6593721" y="3255245"/>
+            <a:ext cx="2870835" cy="738664"/>
+          </a:xfrm>
+          <a:prstGeom prst="rect">
+            <a:avLst/>
+          </a:prstGeom>
+          <a:solidFill>
+            <a:srgbClr val="0070C0"/>
+          </a:solidFill>
+          <a:ln w="19050">
+            <a:solidFill>
+              <a:schemeClr val="tx1"/>
+            </a:solidFill>
+          </a:ln>
+        </p:spPr>
+        <p:txBody>
+          <a:bodyPr wrap="square" rtlCol="0">
+            <a:spAutoFit/>
+          </a:bodyPr>
+          <a:lstStyle/>
+          <a:p>
+            <a:pPr algn="ctr"/>
+            <a:r>
+              <a:rPr lang="en-US" sz="1400" dirty="0">
+                <a:sym typeface="+mn-ea"/>
+              </a:rPr>
+              <a:t>Application Image</a:t>
+            </a:r>
+          </a:p>
+          <a:p>
+            <a:pPr algn="ctr"/>
+            <a:endParaRPr lang="en-US" sz="1400" dirty="0">
+              <a:sym typeface="+mn-ea"/>
+            </a:endParaRPr>
+          </a:p>
+          <a:p>
+            <a:pPr algn="ctr"/>
+            <a:r>
+              <a:rPr lang="en-US" sz="1400" dirty="0"/>
+              <a:t>Plaintext</a:t>
+            </a:r>
+          </a:p>
+        </p:txBody>
+      </p:sp>
+      <p:sp>
+        <p:nvSpPr>
+          <p:cNvPr id="26" name="TextBox 63">
+            <a:extLst>
+              <a:ext uri="{FF2B5EF4-FFF2-40B4-BE49-F238E27FC236}">
+                <a16:creationId xmlns:a16="http://schemas.microsoft.com/office/drawing/2014/main" id="{A61E60B5-41BB-4967-82AD-A464DEF7FCBA}"/>
+              </a:ext>
+            </a:extLst>
+          </p:cNvPr>
+          <p:cNvSpPr txBox="1"/>
+          <p:nvPr/>
+        </p:nvSpPr>
+        <p:spPr>
+          <a:xfrm>
+            <a:off x="6589911" y="4107566"/>
+            <a:ext cx="2870835" cy="521970"/>
+          </a:xfrm>
+          <a:prstGeom prst="rect">
+            <a:avLst/>
+          </a:prstGeom>
+          <a:solidFill>
+            <a:srgbClr val="FFC0CB"/>
+          </a:solidFill>
+          <a:ln w="19050">
+            <a:solidFill>
+              <a:schemeClr val="tx1"/>
+            </a:solidFill>
+          </a:ln>
+        </p:spPr>
+        <p:txBody>
+          <a:bodyPr wrap="square" rtlCol="0">
+            <a:spAutoFit/>
+          </a:bodyPr>
+          <a:lstStyle/>
+          <a:p>
+            <a:pPr algn="ctr"/>
+            <a:r>
+              <a:rPr lang="en-US" sz="1400" dirty="0">
+                <a:sym typeface="+mn-ea"/>
+              </a:rPr>
+              <a:t>HAB Data</a:t>
+            </a:r>
+            <a:endParaRPr lang="en-US" sz="1400" dirty="0"/>
+          </a:p>
+          <a:p>
+            <a:pPr algn="ctr"/>
+            <a:r>
+              <a:rPr lang="en-US" sz="1400" dirty="0">
+                <a:sym typeface="+mn-ea"/>
+              </a:rPr>
+              <a:t>(CSF, Certs, Signatures)</a:t>
+            </a:r>
+            <a:endParaRPr lang="en-US" sz="1400" dirty="0"/>
+          </a:p>
+        </p:txBody>
+      </p:sp>
+      <p:sp>
+        <p:nvSpPr>
+          <p:cNvPr id="27" name="TextBox 63">
+            <a:extLst>
+              <a:ext uri="{FF2B5EF4-FFF2-40B4-BE49-F238E27FC236}">
+                <a16:creationId xmlns:a16="http://schemas.microsoft.com/office/drawing/2014/main" id="{1A6420A2-416B-4BBE-88F7-360A30FAD670}"/>
+              </a:ext>
+            </a:extLst>
+          </p:cNvPr>
+          <p:cNvSpPr txBox="1"/>
+          <p:nvPr/>
+        </p:nvSpPr>
+        <p:spPr>
+          <a:xfrm>
+            <a:off x="6589911" y="4737755"/>
+            <a:ext cx="2870835" cy="306705"/>
+          </a:xfrm>
+          <a:prstGeom prst="rect">
+            <a:avLst/>
+          </a:prstGeom>
+          <a:solidFill>
+            <a:srgbClr val="FF7F00"/>
+          </a:solidFill>
+          <a:ln w="19050">
+            <a:solidFill>
+              <a:schemeClr val="tx1"/>
+            </a:solidFill>
+          </a:ln>
+        </p:spPr>
+        <p:txBody>
+          <a:bodyPr wrap="square" rtlCol="0">
+            <a:spAutoFit/>
+          </a:bodyPr>
+          <a:lstStyle/>
+          <a:p>
+            <a:pPr algn="ctr"/>
+            <a:r>
+              <a:rPr lang="en-US" sz="1400" dirty="0">
+                <a:sym typeface="+mn-ea"/>
+              </a:rPr>
+              <a:t>DEK KeyBlob</a:t>
+            </a:r>
+            <a:endParaRPr lang="en-US" sz="1400" dirty="0"/>
+          </a:p>
+        </p:txBody>
+      </p:sp>
+      <p:sp>
+        <p:nvSpPr>
+          <p:cNvPr id="28" name="TextBox 63">
+            <a:extLst>
+              <a:ext uri="{FF2B5EF4-FFF2-40B4-BE49-F238E27FC236}">
+                <a16:creationId xmlns:a16="http://schemas.microsoft.com/office/drawing/2014/main" id="{2070844C-26D5-47E5-B056-E398CE9857FE}"/>
+              </a:ext>
+            </a:extLst>
+          </p:cNvPr>
+          <p:cNvSpPr txBox="1"/>
+          <p:nvPr/>
+        </p:nvSpPr>
+        <p:spPr>
+          <a:xfrm>
+            <a:off x="6589911" y="2765977"/>
+            <a:ext cx="2870835" cy="276999"/>
+          </a:xfrm>
+          <a:prstGeom prst="rect">
+            <a:avLst/>
+          </a:prstGeom>
+          <a:solidFill>
+            <a:schemeClr val="accent3"/>
+          </a:solidFill>
+          <a:ln w="19050">
+            <a:solidFill>
+              <a:schemeClr val="tx1"/>
+            </a:solidFill>
+          </a:ln>
+        </p:spPr>
+        <p:txBody>
+          <a:bodyPr wrap="square" rtlCol="0">
+            <a:spAutoFit/>
+          </a:bodyPr>
+          <a:lstStyle/>
+          <a:p>
+            <a:pPr algn="ctr"/>
+            <a:r>
+              <a:rPr lang="en-US" sz="1200" dirty="0">
+                <a:sym typeface="+mn-ea"/>
+              </a:rPr>
+              <a:t>Device Configuration Data (DCD)</a:t>
+            </a:r>
+            <a:endParaRPr lang="en-US" sz="1200" dirty="0"/>
           </a:p>
         </p:txBody>
       </p:sp>
@@ -42002,6 +42491,7 @@
       </a:bgFillStyleLst>
     </a:fmtScheme>
   </a:themeElements>
+  <a:objectDefaults/>
   <a:extraClrSchemeLst>
     <a:extraClrScheme>
       <a:clrScheme name="1_Custom Design 1">
@@ -42782,6 +43272,8 @@
       </a:bgFillStyleLst>
     </a:fmtScheme>
   </a:themeElements>
+  <a:objectDefaults/>
+  <a:extraClrSchemeLst/>
   <a:extLst>
     <a:ext uri="{05A4C25C-085E-4340-85A3-A5531E510DB2}">
       <thm15:themeFamily xmlns:thm15="http://schemas.microsoft.com/office/thememl/2012/main" name="Office Theme" id="{62F939B6-93AF-4DB8-9C6B-D6C7DFDC589F}" vid="{4A3C46E8-61CC-4603-A589-7422A47A8E4A}"/>
@@ -43068,6 +43560,8 @@
       </a:bgFillStyleLst>
     </a:fmtScheme>
   </a:themeElements>
+  <a:objectDefaults/>
+  <a:extraClrSchemeLst/>
   <a:extLst>
     <a:ext uri="{05A4C25C-085E-4340-85A3-A5531E510DB2}">
       <thm15:themeFamily xmlns:thm15="http://schemas.microsoft.com/office/thememl/2012/main" name="Office Theme" id="{62F939B6-93AF-4DB8-9C6B-D6C7DFDC589F}" vid="{4A3C46E8-61CC-4603-A589-7422A47A8E4A}"/>

</xml_diff>